<commit_message>
Fix: Corrected Object ID tag description
</commit_message>
<xml_diff>
--- a/第 04 堂/LwM2M 協議.pptx
+++ b/第 04 堂/LwM2M 協議.pptx
@@ -123,6 +123,11 @@
       </a:defRPr>
     </a:lvl9pPr>
   </p:defaultTextStyle>
+  <p:extLst>
+    <p:ext uri="{EFAFB233-063F-42B5-8137-9DF3F51BA10A}">
+      <p15:sldGuideLst xmlns:p15="http://schemas.microsoft.com/office/powerpoint/2012/main"/>
+    </p:ext>
+  </p:extLst>
 </p:presentation>
 </file>
 
@@ -433,7 +438,7 @@
           <a:p>
             <a:fld id="{12241623-A064-4BED-B073-BA4D61433402}" type="datetime1">
               <a:rPr lang="en-US" smtClean="0"/>
-              <a:t>11/23/2024</a:t>
+              <a:t>11/29/2024</a:t>
             </a:fld>
             <a:endParaRPr lang="en-US" dirty="0"/>
           </a:p>
@@ -1244,7 +1249,7 @@
           <a:p>
             <a:fld id="{6F86ED0C-1DA7-41F0-94CF-6218B1FEDFF1}" type="datetime1">
               <a:rPr lang="en-US" smtClean="0"/>
-              <a:t>11/23/2024</a:t>
+              <a:t>11/29/2024</a:t>
             </a:fld>
             <a:endParaRPr lang="en-US" dirty="0"/>
           </a:p>
@@ -1443,7 +1448,7 @@
           <a:p>
             <a:fld id="{EECF02AB-6034-4B88-BC5A-7C17CB0EF809}" type="datetime1">
               <a:rPr lang="en-US" smtClean="0"/>
-              <a:t>11/23/2024</a:t>
+              <a:t>11/29/2024</a:t>
             </a:fld>
             <a:endParaRPr lang="en-US" dirty="0"/>
           </a:p>
@@ -1678,7 +1683,7 @@
           <a:p>
             <a:fld id="{22F3E5F3-28EE-488F-BD53-B744C06C3DEC}" type="datetime1">
               <a:rPr lang="en-US" smtClean="0"/>
-              <a:t>11/23/2024</a:t>
+              <a:t>11/29/2024</a:t>
             </a:fld>
             <a:endParaRPr lang="en-US" dirty="0"/>
           </a:p>
@@ -4371,7 +4376,7 @@
           <a:p>
             <a:fld id="{E72EB70D-CD01-44DA-83B3-8FEB3383D307}" type="datetime1">
               <a:rPr lang="en-US" smtClean="0"/>
-              <a:t>11/23/2024</a:t>
+              <a:t>11/29/2024</a:t>
             </a:fld>
             <a:endParaRPr lang="en-US" dirty="0"/>
           </a:p>
@@ -4567,7 +4572,7 @@
           <a:p>
             <a:fld id="{D0158CFD-9357-46BE-A189-D637A67C8730}" type="datetime1">
               <a:rPr lang="en-US" smtClean="0"/>
-              <a:t>11/23/2024</a:t>
+              <a:t>11/29/2024</a:t>
             </a:fld>
             <a:endParaRPr lang="en-US" dirty="0"/>
           </a:p>
@@ -4956,7 +4961,7 @@
           <a:p>
             <a:fld id="{7B4742EE-B331-4632-BD10-A82FED6B6FC0}" type="datetime1">
               <a:rPr lang="en-US" smtClean="0"/>
-              <a:t>11/23/2024</a:t>
+              <a:t>11/29/2024</a:t>
             </a:fld>
             <a:endParaRPr lang="en-US" dirty="0"/>
           </a:p>
@@ -5122,7 +5127,7 @@
           <a:p>
             <a:fld id="{451BA835-D13F-49F4-8F11-5D576AC65FAD}" type="datetime1">
               <a:rPr lang="en-US" smtClean="0"/>
-              <a:t>11/23/2024</a:t>
+              <a:t>11/29/2024</a:t>
             </a:fld>
             <a:endParaRPr lang="en-US" dirty="0"/>
           </a:p>
@@ -5245,7 +5250,7 @@
           <a:p>
             <a:fld id="{ADBD1799-ACB5-4CB2-86A2-5C574F1C8706}" type="datetime1">
               <a:rPr lang="en-US" smtClean="0"/>
-              <a:t>11/23/2024</a:t>
+              <a:t>11/29/2024</a:t>
             </a:fld>
             <a:endParaRPr lang="en-US" dirty="0"/>
           </a:p>
@@ -5555,7 +5560,7 @@
           <a:p>
             <a:fld id="{ED5DD0D6-7A82-473E-879B-C6ECD6CCCFEC}" type="datetime1">
               <a:rPr lang="en-US" smtClean="0"/>
-              <a:t>11/23/2024</a:t>
+              <a:t>11/29/2024</a:t>
             </a:fld>
             <a:endParaRPr lang="en-US" dirty="0"/>
           </a:p>
@@ -5855,7 +5860,7 @@
           <a:p>
             <a:fld id="{D4605E03-BC17-41A7-854C-DFAB672737DC}" type="datetime1">
               <a:rPr lang="en-US" smtClean="0"/>
-              <a:t>11/23/2024</a:t>
+              <a:t>11/29/2024</a:t>
             </a:fld>
             <a:endParaRPr lang="en-US" dirty="0"/>
           </a:p>
@@ -6107,7 +6112,7 @@
           <a:p>
             <a:fld id="{C4408324-A84C-4A45-93B6-78D079CCE772}" type="datetime1">
               <a:rPr lang="en-US" smtClean="0"/>
-              <a:t>11/23/2024</a:t>
+              <a:t>11/29/2024</a:t>
             </a:fld>
             <a:endParaRPr lang="en-US" dirty="0"/>
           </a:p>
@@ -10913,7 +10918,7 @@
             <p:ph idx="1"/>
             <p:extLst>
               <p:ext uri="{D42A27DB-BD31-4B8C-83A1-F6EECF244321}">
-                <p14:modId xmlns:p14="http://schemas.microsoft.com/office/powerpoint/2010/main" val="1704427533"/>
+                <p14:modId xmlns:p14="http://schemas.microsoft.com/office/powerpoint/2010/main" val="3597310620"/>
               </p:ext>
             </p:extLst>
           </p:nvPr>
@@ -11152,11 +11157,28 @@
                     <a:bodyPr/>
                     <a:lstStyle/>
                     <a:p>
+                      <a:pPr marL="0" marR="0" lvl="0" indent="0" algn="l" defTabSz="914400" rtl="0" eaLnBrk="1" fontAlgn="auto" latinLnBrk="0" hangingPunct="1">
+                        <a:lnSpc>
+                          <a:spcPct val="100000"/>
+                        </a:lnSpc>
+                        <a:spcBef>
+                          <a:spcPts val="0"/>
+                        </a:spcBef>
+                        <a:spcAft>
+                          <a:spcPts val="0"/>
+                        </a:spcAft>
+                        <a:buClrTx/>
+                        <a:buSzTx/>
+                        <a:buFontTx/>
+                        <a:buNone/>
+                        <a:tabLst/>
+                        <a:defRPr/>
+                      </a:pPr>
                       <a:r>
-                        <a:rPr lang="en-US" altLang="zh-TW" sz="1900"/>
-                        <a:t>Firmware Update</a:t>
+                        <a:rPr lang="en-US" altLang="zh-TW" sz="1900" dirty="0"/>
+                        <a:t>Connectivity Monitoring</a:t>
                       </a:r>
-                      <a:endParaRPr lang="zh-TW" altLang="en-US" sz="1900"/>
+                      <a:endParaRPr lang="zh-TW" altLang="en-US" sz="1900" dirty="0"/>
                     </a:p>
                   </a:txBody>
                   <a:tcPr marL="96715" marR="96715" marT="48357" marB="48357"/>
@@ -11181,7 +11203,7 @@
                     <a:lstStyle/>
                     <a:p>
                       <a:r>
-                        <a:rPr lang="zh-TW" altLang="en-US" sz="1900"/>
+                        <a:rPr lang="zh-TW" altLang="en-US" sz="1900" dirty="0"/>
                         <a:t>網絡連接狀態與參數監控</a:t>
                       </a:r>
                     </a:p>
@@ -11201,10 +11223,10 @@
                     <a:lstStyle/>
                     <a:p>
                       <a:r>
-                        <a:rPr lang="en-US" altLang="zh-TW" sz="1900"/>
-                        <a:t>Connectivity Monitoring</a:t>
+                        <a:rPr lang="en-US" altLang="zh-TW" sz="1900" dirty="0"/>
+                        <a:t>Firmware Update</a:t>
                       </a:r>
-                      <a:endParaRPr lang="zh-TW" altLang="en-US" sz="1900"/>
+                      <a:endParaRPr lang="zh-TW" altLang="en-US" sz="1900" dirty="0"/>
                     </a:p>
                   </a:txBody>
                   <a:tcPr marL="96715" marR="96715" marT="48357" marB="48357"/>

</xml_diff>